<commit_message>
FP figures are cute too now. Need to finish presentation.
</commit_message>
<xml_diff>
--- a/evol_2023.pptx
+++ b/evol_2023.pptx
@@ -117,6 +117,11 @@
       </a:defRPr>
     </a:lvl9pPr>
   </p:defaultTextStyle>
+  <p:extLst>
+    <p:ext uri="{EFAFB233-063F-42B5-8137-9DF3F51BA10A}">
+      <p15:sldGuideLst xmlns:p15="http://schemas.microsoft.com/office/powerpoint/2012/main"/>
+    </p:ext>
+  </p:extLst>
 </p:presentation>
 </file>
 
@@ -267,7 +272,7 @@
           <a:p>
             <a:fld id="{2A250DFA-A00A-1D48-81A0-D09D207EAEAB}" type="datetimeFigureOut">
               <a:rPr lang="en-US" smtClean="0"/>
-              <a:t>5/22/23</a:t>
+              <a:t>5/25/23</a:t>
             </a:fld>
             <a:endParaRPr lang="en-US"/>
           </a:p>
@@ -465,7 +470,7 @@
           <a:p>
             <a:fld id="{2A250DFA-A00A-1D48-81A0-D09D207EAEAB}" type="datetimeFigureOut">
               <a:rPr lang="en-US" smtClean="0"/>
-              <a:t>5/22/23</a:t>
+              <a:t>5/25/23</a:t>
             </a:fld>
             <a:endParaRPr lang="en-US"/>
           </a:p>
@@ -673,7 +678,7 @@
           <a:p>
             <a:fld id="{2A250DFA-A00A-1D48-81A0-D09D207EAEAB}" type="datetimeFigureOut">
               <a:rPr lang="en-US" smtClean="0"/>
-              <a:t>5/22/23</a:t>
+              <a:t>5/25/23</a:t>
             </a:fld>
             <a:endParaRPr lang="en-US"/>
           </a:p>
@@ -871,7 +876,7 @@
           <a:p>
             <a:fld id="{2A250DFA-A00A-1D48-81A0-D09D207EAEAB}" type="datetimeFigureOut">
               <a:rPr lang="en-US" smtClean="0"/>
-              <a:t>5/22/23</a:t>
+              <a:t>5/25/23</a:t>
             </a:fld>
             <a:endParaRPr lang="en-US"/>
           </a:p>
@@ -1146,7 +1151,7 @@
           <a:p>
             <a:fld id="{2A250DFA-A00A-1D48-81A0-D09D207EAEAB}" type="datetimeFigureOut">
               <a:rPr lang="en-US" smtClean="0"/>
-              <a:t>5/22/23</a:t>
+              <a:t>5/25/23</a:t>
             </a:fld>
             <a:endParaRPr lang="en-US"/>
           </a:p>
@@ -1411,7 +1416,7 @@
           <a:p>
             <a:fld id="{2A250DFA-A00A-1D48-81A0-D09D207EAEAB}" type="datetimeFigureOut">
               <a:rPr lang="en-US" smtClean="0"/>
-              <a:t>5/22/23</a:t>
+              <a:t>5/25/23</a:t>
             </a:fld>
             <a:endParaRPr lang="en-US"/>
           </a:p>
@@ -1823,7 +1828,7 @@
           <a:p>
             <a:fld id="{2A250DFA-A00A-1D48-81A0-D09D207EAEAB}" type="datetimeFigureOut">
               <a:rPr lang="en-US" smtClean="0"/>
-              <a:t>5/22/23</a:t>
+              <a:t>5/25/23</a:t>
             </a:fld>
             <a:endParaRPr lang="en-US"/>
           </a:p>
@@ -1964,7 +1969,7 @@
           <a:p>
             <a:fld id="{2A250DFA-A00A-1D48-81A0-D09D207EAEAB}" type="datetimeFigureOut">
               <a:rPr lang="en-US" smtClean="0"/>
-              <a:t>5/22/23</a:t>
+              <a:t>5/25/23</a:t>
             </a:fld>
             <a:endParaRPr lang="en-US"/>
           </a:p>
@@ -2077,7 +2082,7 @@
           <a:p>
             <a:fld id="{2A250DFA-A00A-1D48-81A0-D09D207EAEAB}" type="datetimeFigureOut">
               <a:rPr lang="en-US" smtClean="0"/>
-              <a:t>5/22/23</a:t>
+              <a:t>5/25/23</a:t>
             </a:fld>
             <a:endParaRPr lang="en-US"/>
           </a:p>
@@ -2388,7 +2393,7 @@
           <a:p>
             <a:fld id="{2A250DFA-A00A-1D48-81A0-D09D207EAEAB}" type="datetimeFigureOut">
               <a:rPr lang="en-US" smtClean="0"/>
-              <a:t>5/22/23</a:t>
+              <a:t>5/25/23</a:t>
             </a:fld>
             <a:endParaRPr lang="en-US"/>
           </a:p>
@@ -2676,7 +2681,7 @@
           <a:p>
             <a:fld id="{2A250DFA-A00A-1D48-81A0-D09D207EAEAB}" type="datetimeFigureOut">
               <a:rPr lang="en-US" smtClean="0"/>
-              <a:t>5/22/23</a:t>
+              <a:t>5/25/23</a:t>
             </a:fld>
             <a:endParaRPr lang="en-US"/>
           </a:p>
@@ -2917,7 +2922,7 @@
           <a:p>
             <a:fld id="{2A250DFA-A00A-1D48-81A0-D09D207EAEAB}" type="datetimeFigureOut">
               <a:rPr lang="en-US" smtClean="0"/>
-              <a:t>5/22/23</a:t>
+              <a:t>5/25/23</a:t>
             </a:fld>
             <a:endParaRPr lang="en-US"/>
           </a:p>
@@ -3580,7 +3585,18 @@
           <a:bodyPr/>
           <a:lstStyle/>
           <a:p>
-            <a:endParaRPr lang="en-US"/>
+            <a:r>
+              <a:rPr lang="en-US" dirty="0"/>
+              <a:t>Talk to </a:t>
+            </a:r>
+            <a:r>
+              <a:rPr lang="en-US" dirty="0" err="1"/>
+              <a:t>tracy</a:t>
+            </a:r>
+            <a:r>
+              <a:rPr lang="en-US" dirty="0"/>
+              <a:t> about weird pattern: more sampling = more concentration on 0 for no shifts, high q neutral traits (bottom row of figures). Weird, it should be more likely to be spread out since there shouldn’t be a difference (maybe because it’s underestimating the q, so it overestimates speciation for the more common trait, which is 0 just cause it starts there)</a:t>
+            </a:r>
           </a:p>
         </p:txBody>
       </p:sp>

</xml_diff>